<commit_message>
What we learned section of presentation
Finished the what we learned section of the project.
</commit_message>
<xml_diff>
--- a/Presentation IT Professional.pptx
+++ b/Presentation IT Professional.pptx
@@ -12,6 +12,10 @@
     <p:sldId id="260" r:id="rId6"/>
     <p:sldId id="261" r:id="rId7"/>
     <p:sldId id="262" r:id="rId8"/>
+    <p:sldId id="263" r:id="rId9"/>
+    <p:sldId id="264" r:id="rId10"/>
+    <p:sldId id="266" r:id="rId11"/>
+    <p:sldId id="265" r:id="rId12"/>
   </p:sldIdLst>
   <p:sldSz cx="12192000" cy="6858000"/>
   <p:notesSz cx="6858000" cy="9144000"/>
@@ -126,6 +130,14 @@
         </p14:section>
         <p14:section name="Project" id="{C7B8816D-E159-433E-B69E-61622D24D88C}">
           <p14:sldIdLst/>
+        </p14:section>
+        <p14:section name="What we learned" id="{F5AF67EA-83DD-43B7-A6CE-7A9D000E5E4A}">
+          <p14:sldIdLst>
+            <p14:sldId id="263"/>
+            <p14:sldId id="264"/>
+            <p14:sldId id="266"/>
+            <p14:sldId id="265"/>
+          </p14:sldIdLst>
         </p14:section>
       </p14:sectionLst>
     </p:ext>
@@ -7763,7 +7775,7 @@
               <a:t> Kearns &amp; Ross </a:t>
             </a:r>
             <a:r>
-              <a:rPr lang="en-GB"/>
+              <a:rPr lang="en-GB" dirty="0" err="1"/>
               <a:t>Heany</a:t>
             </a:r>
             <a:endParaRPr lang="en-GB" dirty="0"/>
@@ -7774,6 +7786,208 @@
     <p:extLst>
       <p:ext uri="{BB962C8B-B14F-4D97-AF65-F5344CB8AC3E}">
         <p14:creationId xmlns:p14="http://schemas.microsoft.com/office/powerpoint/2010/main" val="2858426690"/>
+      </p:ext>
+    </p:extLst>
+  </p:cSld>
+  <p:clrMapOvr>
+    <a:masterClrMapping/>
+  </p:clrMapOvr>
+</p:sld>
+</file>
+
+<file path=ppt/slides/slide10.xml><?xml version="1.0" encoding="utf-8"?>
+<p:sld xmlns:a="http://schemas.openxmlformats.org/drawingml/2006/main" xmlns:r="http://schemas.openxmlformats.org/officeDocument/2006/relationships" xmlns:p="http://schemas.openxmlformats.org/presentationml/2006/main">
+  <p:cSld>
+    <p:spTree>
+      <p:nvGrpSpPr>
+        <p:cNvPr id="1" name=""/>
+        <p:cNvGrpSpPr/>
+        <p:nvPr/>
+      </p:nvGrpSpPr>
+      <p:grpSpPr>
+        <a:xfrm>
+          <a:off x="0" y="0"/>
+          <a:ext cx="0" cy="0"/>
+          <a:chOff x="0" y="0"/>
+          <a:chExt cx="0" cy="0"/>
+        </a:xfrm>
+      </p:grpSpPr>
+      <p:sp>
+        <p:nvSpPr>
+          <p:cNvPr id="2" name="Title 1">
+            <a:extLst>
+              <a:ext uri="{FF2B5EF4-FFF2-40B4-BE49-F238E27FC236}">
+                <a16:creationId xmlns:a16="http://schemas.microsoft.com/office/drawing/2014/main" id="{9865FCFC-9E25-4808-8C7E-328E0ECD7D70}"/>
+              </a:ext>
+            </a:extLst>
+          </p:cNvPr>
+          <p:cNvSpPr>
+            <a:spLocks noGrp="1"/>
+          </p:cNvSpPr>
+          <p:nvPr>
+            <p:ph type="title"/>
+          </p:nvPr>
+        </p:nvSpPr>
+        <p:spPr/>
+        <p:txBody>
+          <a:bodyPr/>
+          <a:lstStyle/>
+          <a:p>
+            <a:r>
+              <a:rPr lang="en-GB" dirty="0"/>
+              <a:t>Difficulties we ran into 	</a:t>
+            </a:r>
+          </a:p>
+        </p:txBody>
+      </p:sp>
+      <p:sp>
+        <p:nvSpPr>
+          <p:cNvPr id="3" name="Content Placeholder 2">
+            <a:extLst>
+              <a:ext uri="{FF2B5EF4-FFF2-40B4-BE49-F238E27FC236}">
+                <a16:creationId xmlns:a16="http://schemas.microsoft.com/office/drawing/2014/main" id="{2331F9DB-C529-4EBC-B868-3F5F1669F702}"/>
+              </a:ext>
+            </a:extLst>
+          </p:cNvPr>
+          <p:cNvSpPr>
+            <a:spLocks noGrp="1"/>
+          </p:cNvSpPr>
+          <p:nvPr>
+            <p:ph idx="1"/>
+          </p:nvPr>
+        </p:nvSpPr>
+        <p:spPr/>
+        <p:txBody>
+          <a:bodyPr/>
+          <a:lstStyle/>
+          <a:p>
+            <a:r>
+              <a:rPr lang="en-GB" dirty="0"/>
+              <a:t>Time management was difficult as a lot of work goes into maintaining a good work ethic and developing complex functionality for an ecommerce site</a:t>
+            </a:r>
+          </a:p>
+          <a:p>
+            <a:r>
+              <a:rPr lang="en-GB" dirty="0"/>
+              <a:t>Merge errors occurred a decent amount as it is almost impossible to avoid merge errors in a group project</a:t>
+            </a:r>
+          </a:p>
+          <a:p>
+            <a:r>
+              <a:rPr lang="en-GB" dirty="0"/>
+              <a:t>Relearning angular and improving our knowledge of mongo and angular was difficult at the start as we had to remember and improve our knowledge of the technology</a:t>
+            </a:r>
+          </a:p>
+        </p:txBody>
+      </p:sp>
+    </p:spTree>
+    <p:extLst>
+      <p:ext uri="{BB962C8B-B14F-4D97-AF65-F5344CB8AC3E}">
+        <p14:creationId xmlns:p14="http://schemas.microsoft.com/office/powerpoint/2010/main" val="1744646622"/>
+      </p:ext>
+    </p:extLst>
+  </p:cSld>
+  <p:clrMapOvr>
+    <a:masterClrMapping/>
+  </p:clrMapOvr>
+</p:sld>
+</file>
+
+<file path=ppt/slides/slide11.xml><?xml version="1.0" encoding="utf-8"?>
+<p:sld xmlns:a="http://schemas.openxmlformats.org/drawingml/2006/main" xmlns:r="http://schemas.openxmlformats.org/officeDocument/2006/relationships" xmlns:p="http://schemas.openxmlformats.org/presentationml/2006/main">
+  <p:cSld>
+    <p:spTree>
+      <p:nvGrpSpPr>
+        <p:cNvPr id="1" name=""/>
+        <p:cNvGrpSpPr/>
+        <p:nvPr/>
+      </p:nvGrpSpPr>
+      <p:grpSpPr>
+        <a:xfrm>
+          <a:off x="0" y="0"/>
+          <a:ext cx="0" cy="0"/>
+          <a:chOff x="0" y="0"/>
+          <a:chExt cx="0" cy="0"/>
+        </a:xfrm>
+      </p:grpSpPr>
+      <p:sp>
+        <p:nvSpPr>
+          <p:cNvPr id="2" name="Title 1">
+            <a:extLst>
+              <a:ext uri="{FF2B5EF4-FFF2-40B4-BE49-F238E27FC236}">
+                <a16:creationId xmlns:a16="http://schemas.microsoft.com/office/drawing/2014/main" id="{B392BC85-3A3A-4D7F-916C-EF5D3CCBBE17}"/>
+              </a:ext>
+            </a:extLst>
+          </p:cNvPr>
+          <p:cNvSpPr>
+            <a:spLocks noGrp="1"/>
+          </p:cNvSpPr>
+          <p:nvPr>
+            <p:ph type="title"/>
+          </p:nvPr>
+        </p:nvSpPr>
+        <p:spPr/>
+        <p:txBody>
+          <a:bodyPr/>
+          <a:lstStyle/>
+          <a:p>
+            <a:r>
+              <a:rPr lang="en-GB" dirty="0"/>
+              <a:t>Overall Impression of Project	</a:t>
+            </a:r>
+          </a:p>
+        </p:txBody>
+      </p:sp>
+      <p:sp>
+        <p:nvSpPr>
+          <p:cNvPr id="3" name="Content Placeholder 2">
+            <a:extLst>
+              <a:ext uri="{FF2B5EF4-FFF2-40B4-BE49-F238E27FC236}">
+                <a16:creationId xmlns:a16="http://schemas.microsoft.com/office/drawing/2014/main" id="{3675C65F-CDF6-491D-B98B-104495AD1092}"/>
+              </a:ext>
+            </a:extLst>
+          </p:cNvPr>
+          <p:cNvSpPr>
+            <a:spLocks noGrp="1"/>
+          </p:cNvSpPr>
+          <p:nvPr>
+            <p:ph idx="1"/>
+          </p:nvPr>
+        </p:nvSpPr>
+        <p:spPr/>
+        <p:txBody>
+          <a:bodyPr/>
+          <a:lstStyle/>
+          <a:p>
+            <a:r>
+              <a:rPr lang="en-GB" dirty="0"/>
+              <a:t>Overall developing this project was a good experience as it thought us more about the MEAN stack and how to utilize it in a professional style application</a:t>
+            </a:r>
+          </a:p>
+          <a:p>
+            <a:r>
+              <a:rPr lang="en-GB" dirty="0"/>
+              <a:t>The project offered us many insights in what goes into an ecommerce sight and how to design the site from a user’s perspective</a:t>
+            </a:r>
+          </a:p>
+          <a:p>
+            <a:r>
+              <a:rPr lang="en-GB" dirty="0"/>
+              <a:t>The project also showed us the full extent of the job responsibilities of a full stack developer</a:t>
+            </a:r>
+          </a:p>
+          <a:p>
+            <a:r>
+              <a:rPr lang="en-GB" dirty="0"/>
+              <a:t>The project showed us what a typical working environment would be like </a:t>
+            </a:r>
+          </a:p>
+        </p:txBody>
+      </p:sp>
+    </p:spTree>
+    <p:extLst>
+      <p:ext uri="{BB962C8B-B14F-4D97-AF65-F5344CB8AC3E}">
+        <p14:creationId xmlns:p14="http://schemas.microsoft.com/office/powerpoint/2010/main" val="4245027484"/>
       </p:ext>
     </p:extLst>
   </p:cSld>
@@ -8531,6 +8745,237 @@
     <p:extLst>
       <p:ext uri="{BB962C8B-B14F-4D97-AF65-F5344CB8AC3E}">
         <p14:creationId xmlns:p14="http://schemas.microsoft.com/office/powerpoint/2010/main" val="3496339283"/>
+      </p:ext>
+    </p:extLst>
+  </p:cSld>
+  <p:clrMapOvr>
+    <a:masterClrMapping/>
+  </p:clrMapOvr>
+</p:sld>
+</file>
+
+<file path=ppt/slides/slide8.xml><?xml version="1.0" encoding="utf-8"?>
+<p:sld xmlns:a="http://schemas.openxmlformats.org/drawingml/2006/main" xmlns:r="http://schemas.openxmlformats.org/officeDocument/2006/relationships" xmlns:p="http://schemas.openxmlformats.org/presentationml/2006/main">
+  <p:cSld>
+    <p:spTree>
+      <p:nvGrpSpPr>
+        <p:cNvPr id="1" name=""/>
+        <p:cNvGrpSpPr/>
+        <p:nvPr/>
+      </p:nvGrpSpPr>
+      <p:grpSpPr>
+        <a:xfrm>
+          <a:off x="0" y="0"/>
+          <a:ext cx="0" cy="0"/>
+          <a:chOff x="0" y="0"/>
+          <a:chExt cx="0" cy="0"/>
+        </a:xfrm>
+      </p:grpSpPr>
+      <p:sp>
+        <p:nvSpPr>
+          <p:cNvPr id="2" name="Title 1">
+            <a:extLst>
+              <a:ext uri="{FF2B5EF4-FFF2-40B4-BE49-F238E27FC236}">
+                <a16:creationId xmlns:a16="http://schemas.microsoft.com/office/drawing/2014/main" id="{E65B0746-D04D-4708-A679-7A1A92BB4FD1}"/>
+              </a:ext>
+            </a:extLst>
+          </p:cNvPr>
+          <p:cNvSpPr>
+            <a:spLocks noGrp="1"/>
+          </p:cNvSpPr>
+          <p:nvPr>
+            <p:ph type="title"/>
+          </p:nvPr>
+        </p:nvSpPr>
+        <p:spPr/>
+        <p:txBody>
+          <a:bodyPr/>
+          <a:lstStyle/>
+          <a:p>
+            <a:r>
+              <a:rPr lang="en-GB" dirty="0"/>
+              <a:t>What we learned	</a:t>
+            </a:r>
+          </a:p>
+        </p:txBody>
+      </p:sp>
+      <p:sp>
+        <p:nvSpPr>
+          <p:cNvPr id="3" name="Content Placeholder 2">
+            <a:extLst>
+              <a:ext uri="{FF2B5EF4-FFF2-40B4-BE49-F238E27FC236}">
+                <a16:creationId xmlns:a16="http://schemas.microsoft.com/office/drawing/2014/main" id="{BE114FD1-D7D6-4B43-8EA0-69F4EA31E9B7}"/>
+              </a:ext>
+            </a:extLst>
+          </p:cNvPr>
+          <p:cNvSpPr>
+            <a:spLocks noGrp="1"/>
+          </p:cNvSpPr>
+          <p:nvPr>
+            <p:ph idx="1"/>
+          </p:nvPr>
+        </p:nvSpPr>
+        <p:spPr/>
+        <p:txBody>
+          <a:bodyPr/>
+          <a:lstStyle/>
+          <a:p>
+            <a:r>
+              <a:rPr lang="en-GB" dirty="0"/>
+              <a:t>We learned how to work with the MEAN stack effectively and how to fully develop a full stack application</a:t>
+            </a:r>
+          </a:p>
+          <a:p>
+            <a:r>
+              <a:rPr lang="en-GB" dirty="0"/>
+              <a:t>We learned about UI design and how to create a good user experience</a:t>
+            </a:r>
+          </a:p>
+          <a:p>
+            <a:r>
+              <a:rPr lang="en-GB" dirty="0"/>
+              <a:t>We learned how to work in a team and fix merge errors which occurred in the project repository</a:t>
+            </a:r>
+          </a:p>
+          <a:p>
+            <a:r>
+              <a:rPr lang="en-GB" dirty="0"/>
+              <a:t>We learned time-management skills</a:t>
+            </a:r>
+          </a:p>
+          <a:p>
+            <a:r>
+              <a:rPr lang="en-GB" dirty="0"/>
+              <a:t>We learned how to manage projects and delegate work during the development of the project</a:t>
+            </a:r>
+          </a:p>
+          <a:p>
+            <a:endParaRPr lang="en-GB" dirty="0"/>
+          </a:p>
+        </p:txBody>
+      </p:sp>
+    </p:spTree>
+    <p:extLst>
+      <p:ext uri="{BB962C8B-B14F-4D97-AF65-F5344CB8AC3E}">
+        <p14:creationId xmlns:p14="http://schemas.microsoft.com/office/powerpoint/2010/main" val="1249355340"/>
+      </p:ext>
+    </p:extLst>
+  </p:cSld>
+  <p:clrMapOvr>
+    <a:masterClrMapping/>
+  </p:clrMapOvr>
+</p:sld>
+</file>
+
+<file path=ppt/slides/slide9.xml><?xml version="1.0" encoding="utf-8"?>
+<p:sld xmlns:a="http://schemas.openxmlformats.org/drawingml/2006/main" xmlns:r="http://schemas.openxmlformats.org/officeDocument/2006/relationships" xmlns:p="http://schemas.openxmlformats.org/presentationml/2006/main">
+  <p:cSld>
+    <p:spTree>
+      <p:nvGrpSpPr>
+        <p:cNvPr id="1" name=""/>
+        <p:cNvGrpSpPr/>
+        <p:nvPr/>
+      </p:nvGrpSpPr>
+      <p:grpSpPr>
+        <a:xfrm>
+          <a:off x="0" y="0"/>
+          <a:ext cx="0" cy="0"/>
+          <a:chOff x="0" y="0"/>
+          <a:chExt cx="0" cy="0"/>
+        </a:xfrm>
+      </p:grpSpPr>
+      <p:sp>
+        <p:nvSpPr>
+          <p:cNvPr id="2" name="Title 1">
+            <a:extLst>
+              <a:ext uri="{FF2B5EF4-FFF2-40B4-BE49-F238E27FC236}">
+                <a16:creationId xmlns:a16="http://schemas.microsoft.com/office/drawing/2014/main" id="{C18C8139-0834-4A5D-97AA-48E4ACEDB1EB}"/>
+              </a:ext>
+            </a:extLst>
+          </p:cNvPr>
+          <p:cNvSpPr>
+            <a:spLocks noGrp="1"/>
+          </p:cNvSpPr>
+          <p:nvPr>
+            <p:ph type="title"/>
+          </p:nvPr>
+        </p:nvSpPr>
+        <p:spPr/>
+        <p:txBody>
+          <a:bodyPr/>
+          <a:lstStyle/>
+          <a:p>
+            <a:r>
+              <a:rPr lang="en-GB" dirty="0"/>
+              <a:t>Skills learned	</a:t>
+            </a:r>
+          </a:p>
+        </p:txBody>
+      </p:sp>
+      <p:sp>
+        <p:nvSpPr>
+          <p:cNvPr id="3" name="Content Placeholder 2">
+            <a:extLst>
+              <a:ext uri="{FF2B5EF4-FFF2-40B4-BE49-F238E27FC236}">
+                <a16:creationId xmlns:a16="http://schemas.microsoft.com/office/drawing/2014/main" id="{43B5CFF7-417B-4C3A-AFE5-E65275938EA2}"/>
+              </a:ext>
+            </a:extLst>
+          </p:cNvPr>
+          <p:cNvSpPr>
+            <a:spLocks noGrp="1"/>
+          </p:cNvSpPr>
+          <p:nvPr>
+            <p:ph idx="1"/>
+          </p:nvPr>
+        </p:nvSpPr>
+        <p:spPr/>
+        <p:txBody>
+          <a:bodyPr/>
+          <a:lstStyle/>
+          <a:p>
+            <a:r>
+              <a:rPr lang="en-GB" dirty="0"/>
+              <a:t>We learned different terminology in angular</a:t>
+            </a:r>
+          </a:p>
+          <a:p>
+            <a:r>
+              <a:rPr lang="en-GB" dirty="0"/>
+              <a:t>We learned how to develop a backend to retrieve and get information from a database</a:t>
+            </a:r>
+          </a:p>
+          <a:p>
+            <a:r>
+              <a:rPr lang="en-GB" dirty="0"/>
+              <a:t>We improved our knowledge of Mongo and the MEAN stack in general</a:t>
+            </a:r>
+          </a:p>
+          <a:p>
+            <a:r>
+              <a:rPr lang="en-GB" dirty="0"/>
+              <a:t>We learned how to break a </a:t>
+            </a:r>
+            <a:r>
+              <a:rPr lang="en-GB" dirty="0" err="1"/>
+              <a:t>github</a:t>
+            </a:r>
+            <a:r>
+              <a:rPr lang="en-GB" dirty="0"/>
+              <a:t> repository into branches for a professional development environment</a:t>
+            </a:r>
+          </a:p>
+          <a:p>
+            <a:r>
+              <a:rPr lang="en-GB" dirty="0"/>
+              <a:t>We learned communication skills in the course of this module when discussing our progress with the supervisor</a:t>
+            </a:r>
+          </a:p>
+        </p:txBody>
+      </p:sp>
+    </p:spTree>
+    <p:extLst>
+      <p:ext uri="{BB962C8B-B14F-4D97-AF65-F5344CB8AC3E}">
+        <p14:creationId xmlns:p14="http://schemas.microsoft.com/office/powerpoint/2010/main" val="2743008040"/>
       </p:ext>
     </p:extLst>
   </p:cSld>

</xml_diff>

<commit_message>
Added slides for project need work
Project aims and goals and empty slide layouts
</commit_message>
<xml_diff>
--- a/Presentation IT Professional.pptx
+++ b/Presentation IT Professional.pptx
@@ -12,10 +12,13 @@
     <p:sldId id="260" r:id="rId6"/>
     <p:sldId id="261" r:id="rId7"/>
     <p:sldId id="262" r:id="rId8"/>
-    <p:sldId id="263" r:id="rId9"/>
-    <p:sldId id="264" r:id="rId10"/>
-    <p:sldId id="266" r:id="rId11"/>
-    <p:sldId id="265" r:id="rId12"/>
+    <p:sldId id="267" r:id="rId9"/>
+    <p:sldId id="268" r:id="rId10"/>
+    <p:sldId id="269" r:id="rId11"/>
+    <p:sldId id="263" r:id="rId12"/>
+    <p:sldId id="264" r:id="rId13"/>
+    <p:sldId id="266" r:id="rId14"/>
+    <p:sldId id="265" r:id="rId15"/>
   </p:sldIdLst>
   <p:sldSz cx="12192000" cy="6858000"/>
   <p:notesSz cx="6858000" cy="9144000"/>
@@ -129,7 +132,11 @@
           </p14:sldIdLst>
         </p14:section>
         <p14:section name="Project" id="{C7B8816D-E159-433E-B69E-61622D24D88C}">
-          <p14:sldIdLst/>
+          <p14:sldIdLst>
+            <p14:sldId id="267"/>
+            <p14:sldId id="268"/>
+            <p14:sldId id="269"/>
+          </p14:sldIdLst>
         </p14:section>
         <p14:section name="What we learned" id="{F5AF67EA-83DD-43B7-A6CE-7A9D000E5E4A}">
           <p14:sldIdLst>
@@ -140,6 +147,9 @@
           </p14:sldIdLst>
         </p14:section>
       </p14:sectionLst>
+    </p:ext>
+    <p:ext uri="{EFAFB233-063F-42B5-8137-9DF3F51BA10A}">
+      <p15:sldGuideLst xmlns:p15="http://schemas.microsoft.com/office/powerpoint/2012/main"/>
     </p:ext>
   </p:extLst>
 </p:presentation>
@@ -7817,6 +7827,324 @@
           <p:cNvPr id="2" name="Title 1">
             <a:extLst>
               <a:ext uri="{FF2B5EF4-FFF2-40B4-BE49-F238E27FC236}">
+                <a16:creationId xmlns:a16="http://schemas.microsoft.com/office/drawing/2014/main" id="{D45B026C-DBC3-45BF-B29F-AAB02E4D869F}"/>
+              </a:ext>
+            </a:extLst>
+          </p:cNvPr>
+          <p:cNvSpPr>
+            <a:spLocks noGrp="1"/>
+          </p:cNvSpPr>
+          <p:nvPr>
+            <p:ph type="title"/>
+          </p:nvPr>
+        </p:nvSpPr>
+        <p:spPr/>
+        <p:txBody>
+          <a:bodyPr/>
+          <a:lstStyle/>
+          <a:p>
+            <a:r>
+              <a:rPr lang="en-GB" dirty="0"/>
+              <a:t>How we used </a:t>
+            </a:r>
+            <a:r>
+              <a:rPr lang="en-GB"/>
+              <a:t>project technologies</a:t>
+            </a:r>
+          </a:p>
+        </p:txBody>
+      </p:sp>
+      <p:sp>
+        <p:nvSpPr>
+          <p:cNvPr id="3" name="Content Placeholder 2">
+            <a:extLst>
+              <a:ext uri="{FF2B5EF4-FFF2-40B4-BE49-F238E27FC236}">
+                <a16:creationId xmlns:a16="http://schemas.microsoft.com/office/drawing/2014/main" id="{37DB055E-F5DE-4BEA-A19B-639FF2699AD6}"/>
+              </a:ext>
+            </a:extLst>
+          </p:cNvPr>
+          <p:cNvSpPr>
+            <a:spLocks noGrp="1"/>
+          </p:cNvSpPr>
+          <p:nvPr>
+            <p:ph idx="1"/>
+          </p:nvPr>
+        </p:nvSpPr>
+        <p:spPr/>
+        <p:txBody>
+          <a:bodyPr/>
+          <a:lstStyle/>
+          <a:p>
+            <a:endParaRPr lang="en-GB"/>
+          </a:p>
+        </p:txBody>
+      </p:sp>
+    </p:spTree>
+    <p:extLst>
+      <p:ext uri="{BB962C8B-B14F-4D97-AF65-F5344CB8AC3E}">
+        <p14:creationId xmlns:p14="http://schemas.microsoft.com/office/powerpoint/2010/main" val="1558232998"/>
+      </p:ext>
+    </p:extLst>
+  </p:cSld>
+  <p:clrMapOvr>
+    <a:masterClrMapping/>
+  </p:clrMapOvr>
+</p:sld>
+</file>
+
+<file path=ppt/slides/slide11.xml><?xml version="1.0" encoding="utf-8"?>
+<p:sld xmlns:a="http://schemas.openxmlformats.org/drawingml/2006/main" xmlns:r="http://schemas.openxmlformats.org/officeDocument/2006/relationships" xmlns:p="http://schemas.openxmlformats.org/presentationml/2006/main">
+  <p:cSld>
+    <p:spTree>
+      <p:nvGrpSpPr>
+        <p:cNvPr id="1" name=""/>
+        <p:cNvGrpSpPr/>
+        <p:nvPr/>
+      </p:nvGrpSpPr>
+      <p:grpSpPr>
+        <a:xfrm>
+          <a:off x="0" y="0"/>
+          <a:ext cx="0" cy="0"/>
+          <a:chOff x="0" y="0"/>
+          <a:chExt cx="0" cy="0"/>
+        </a:xfrm>
+      </p:grpSpPr>
+      <p:sp>
+        <p:nvSpPr>
+          <p:cNvPr id="2" name="Title 1">
+            <a:extLst>
+              <a:ext uri="{FF2B5EF4-FFF2-40B4-BE49-F238E27FC236}">
+                <a16:creationId xmlns:a16="http://schemas.microsoft.com/office/drawing/2014/main" id="{E65B0746-D04D-4708-A679-7A1A92BB4FD1}"/>
+              </a:ext>
+            </a:extLst>
+          </p:cNvPr>
+          <p:cNvSpPr>
+            <a:spLocks noGrp="1"/>
+          </p:cNvSpPr>
+          <p:nvPr>
+            <p:ph type="title"/>
+          </p:nvPr>
+        </p:nvSpPr>
+        <p:spPr/>
+        <p:txBody>
+          <a:bodyPr/>
+          <a:lstStyle/>
+          <a:p>
+            <a:r>
+              <a:rPr lang="en-GB" dirty="0"/>
+              <a:t>What we learned	</a:t>
+            </a:r>
+          </a:p>
+        </p:txBody>
+      </p:sp>
+      <p:sp>
+        <p:nvSpPr>
+          <p:cNvPr id="3" name="Content Placeholder 2">
+            <a:extLst>
+              <a:ext uri="{FF2B5EF4-FFF2-40B4-BE49-F238E27FC236}">
+                <a16:creationId xmlns:a16="http://schemas.microsoft.com/office/drawing/2014/main" id="{BE114FD1-D7D6-4B43-8EA0-69F4EA31E9B7}"/>
+              </a:ext>
+            </a:extLst>
+          </p:cNvPr>
+          <p:cNvSpPr>
+            <a:spLocks noGrp="1"/>
+          </p:cNvSpPr>
+          <p:nvPr>
+            <p:ph idx="1"/>
+          </p:nvPr>
+        </p:nvSpPr>
+        <p:spPr/>
+        <p:txBody>
+          <a:bodyPr/>
+          <a:lstStyle/>
+          <a:p>
+            <a:r>
+              <a:rPr lang="en-GB" dirty="0"/>
+              <a:t>We learned how to work with the MEAN stack effectively and how to fully develop a full stack application</a:t>
+            </a:r>
+          </a:p>
+          <a:p>
+            <a:r>
+              <a:rPr lang="en-GB" dirty="0"/>
+              <a:t>We learned about UI design and how to create a good user experience</a:t>
+            </a:r>
+          </a:p>
+          <a:p>
+            <a:r>
+              <a:rPr lang="en-GB" dirty="0"/>
+              <a:t>We learned how to work in a team and fix merge errors which occurred in the project repository</a:t>
+            </a:r>
+          </a:p>
+          <a:p>
+            <a:r>
+              <a:rPr lang="en-GB" dirty="0"/>
+              <a:t>We learned time-management skills</a:t>
+            </a:r>
+          </a:p>
+          <a:p>
+            <a:r>
+              <a:rPr lang="en-GB" dirty="0"/>
+              <a:t>We learned how to manage projects and delegate work during the development of the project</a:t>
+            </a:r>
+          </a:p>
+          <a:p>
+            <a:endParaRPr lang="en-GB" dirty="0"/>
+          </a:p>
+        </p:txBody>
+      </p:sp>
+    </p:spTree>
+    <p:extLst>
+      <p:ext uri="{BB962C8B-B14F-4D97-AF65-F5344CB8AC3E}">
+        <p14:creationId xmlns:p14="http://schemas.microsoft.com/office/powerpoint/2010/main" val="1249355340"/>
+      </p:ext>
+    </p:extLst>
+  </p:cSld>
+  <p:clrMapOvr>
+    <a:masterClrMapping/>
+  </p:clrMapOvr>
+</p:sld>
+</file>
+
+<file path=ppt/slides/slide12.xml><?xml version="1.0" encoding="utf-8"?>
+<p:sld xmlns:a="http://schemas.openxmlformats.org/drawingml/2006/main" xmlns:r="http://schemas.openxmlformats.org/officeDocument/2006/relationships" xmlns:p="http://schemas.openxmlformats.org/presentationml/2006/main">
+  <p:cSld>
+    <p:spTree>
+      <p:nvGrpSpPr>
+        <p:cNvPr id="1" name=""/>
+        <p:cNvGrpSpPr/>
+        <p:nvPr/>
+      </p:nvGrpSpPr>
+      <p:grpSpPr>
+        <a:xfrm>
+          <a:off x="0" y="0"/>
+          <a:ext cx="0" cy="0"/>
+          <a:chOff x="0" y="0"/>
+          <a:chExt cx="0" cy="0"/>
+        </a:xfrm>
+      </p:grpSpPr>
+      <p:sp>
+        <p:nvSpPr>
+          <p:cNvPr id="2" name="Title 1">
+            <a:extLst>
+              <a:ext uri="{FF2B5EF4-FFF2-40B4-BE49-F238E27FC236}">
+                <a16:creationId xmlns:a16="http://schemas.microsoft.com/office/drawing/2014/main" id="{C18C8139-0834-4A5D-97AA-48E4ACEDB1EB}"/>
+              </a:ext>
+            </a:extLst>
+          </p:cNvPr>
+          <p:cNvSpPr>
+            <a:spLocks noGrp="1"/>
+          </p:cNvSpPr>
+          <p:nvPr>
+            <p:ph type="title"/>
+          </p:nvPr>
+        </p:nvSpPr>
+        <p:spPr/>
+        <p:txBody>
+          <a:bodyPr/>
+          <a:lstStyle/>
+          <a:p>
+            <a:r>
+              <a:rPr lang="en-GB" dirty="0"/>
+              <a:t>Skills learned	</a:t>
+            </a:r>
+          </a:p>
+        </p:txBody>
+      </p:sp>
+      <p:sp>
+        <p:nvSpPr>
+          <p:cNvPr id="3" name="Content Placeholder 2">
+            <a:extLst>
+              <a:ext uri="{FF2B5EF4-FFF2-40B4-BE49-F238E27FC236}">
+                <a16:creationId xmlns:a16="http://schemas.microsoft.com/office/drawing/2014/main" id="{43B5CFF7-417B-4C3A-AFE5-E65275938EA2}"/>
+              </a:ext>
+            </a:extLst>
+          </p:cNvPr>
+          <p:cNvSpPr>
+            <a:spLocks noGrp="1"/>
+          </p:cNvSpPr>
+          <p:nvPr>
+            <p:ph idx="1"/>
+          </p:nvPr>
+        </p:nvSpPr>
+        <p:spPr/>
+        <p:txBody>
+          <a:bodyPr/>
+          <a:lstStyle/>
+          <a:p>
+            <a:r>
+              <a:rPr lang="en-GB" dirty="0"/>
+              <a:t>We learned different terminology in angular</a:t>
+            </a:r>
+          </a:p>
+          <a:p>
+            <a:r>
+              <a:rPr lang="en-GB" dirty="0"/>
+              <a:t>We learned how to develop a backend to retrieve and get information from a database</a:t>
+            </a:r>
+          </a:p>
+          <a:p>
+            <a:r>
+              <a:rPr lang="en-GB" dirty="0"/>
+              <a:t>We improved our knowledge of Mongo and the MEAN stack in general</a:t>
+            </a:r>
+          </a:p>
+          <a:p>
+            <a:r>
+              <a:rPr lang="en-GB" dirty="0"/>
+              <a:t>We learned how to break a </a:t>
+            </a:r>
+            <a:r>
+              <a:rPr lang="en-GB" dirty="0" err="1"/>
+              <a:t>github</a:t>
+            </a:r>
+            <a:r>
+              <a:rPr lang="en-GB" dirty="0"/>
+              <a:t> repository into branches for a professional development environment</a:t>
+            </a:r>
+          </a:p>
+          <a:p>
+            <a:r>
+              <a:rPr lang="en-GB" dirty="0"/>
+              <a:t>We learned communication skills in the course of this module when discussing our progress with the supervisor</a:t>
+            </a:r>
+          </a:p>
+        </p:txBody>
+      </p:sp>
+    </p:spTree>
+    <p:extLst>
+      <p:ext uri="{BB962C8B-B14F-4D97-AF65-F5344CB8AC3E}">
+        <p14:creationId xmlns:p14="http://schemas.microsoft.com/office/powerpoint/2010/main" val="2743008040"/>
+      </p:ext>
+    </p:extLst>
+  </p:cSld>
+  <p:clrMapOvr>
+    <a:masterClrMapping/>
+  </p:clrMapOvr>
+</p:sld>
+</file>
+
+<file path=ppt/slides/slide13.xml><?xml version="1.0" encoding="utf-8"?>
+<p:sld xmlns:a="http://schemas.openxmlformats.org/drawingml/2006/main" xmlns:r="http://schemas.openxmlformats.org/officeDocument/2006/relationships" xmlns:p="http://schemas.openxmlformats.org/presentationml/2006/main">
+  <p:cSld>
+    <p:spTree>
+      <p:nvGrpSpPr>
+        <p:cNvPr id="1" name=""/>
+        <p:cNvGrpSpPr/>
+        <p:nvPr/>
+      </p:nvGrpSpPr>
+      <p:grpSpPr>
+        <a:xfrm>
+          <a:off x="0" y="0"/>
+          <a:ext cx="0" cy="0"/>
+          <a:chOff x="0" y="0"/>
+          <a:chExt cx="0" cy="0"/>
+        </a:xfrm>
+      </p:grpSpPr>
+      <p:sp>
+        <p:nvSpPr>
+          <p:cNvPr id="2" name="Title 1">
+            <a:extLst>
+              <a:ext uri="{FF2B5EF4-FFF2-40B4-BE49-F238E27FC236}">
                 <a16:creationId xmlns:a16="http://schemas.microsoft.com/office/drawing/2014/main" id="{9865FCFC-9E25-4808-8C7E-328E0ECD7D70}"/>
               </a:ext>
             </a:extLst>
@@ -7893,7 +8221,7 @@
 </p:sld>
 </file>
 
-<file path=ppt/slides/slide11.xml><?xml version="1.0" encoding="utf-8"?>
+<file path=ppt/slides/slide14.xml><?xml version="1.0" encoding="utf-8"?>
 <p:sld xmlns:a="http://schemas.openxmlformats.org/drawingml/2006/main" xmlns:r="http://schemas.openxmlformats.org/officeDocument/2006/relationships" xmlns:p="http://schemas.openxmlformats.org/presentationml/2006/main">
   <p:cSld>
     <p:spTree>
@@ -8776,7 +9104,7 @@
           <p:cNvPr id="2" name="Title 1">
             <a:extLst>
               <a:ext uri="{FF2B5EF4-FFF2-40B4-BE49-F238E27FC236}">
-                <a16:creationId xmlns:a16="http://schemas.microsoft.com/office/drawing/2014/main" id="{E65B0746-D04D-4708-A679-7A1A92BB4FD1}"/>
+                <a16:creationId xmlns:a16="http://schemas.microsoft.com/office/drawing/2014/main" id="{595FFB79-C64D-445F-82DD-E3C4E96D957E}"/>
               </a:ext>
             </a:extLst>
           </p:cNvPr>
@@ -8794,7 +9122,7 @@
           <a:p>
             <a:r>
               <a:rPr lang="en-GB" dirty="0"/>
-              <a:t>What we learned	</a:t>
+              <a:t>Project Aims &amp; Goals</a:t>
             </a:r>
           </a:p>
         </p:txBody>
@@ -8804,7 +9132,7 @@
           <p:cNvPr id="3" name="Content Placeholder 2">
             <a:extLst>
               <a:ext uri="{FF2B5EF4-FFF2-40B4-BE49-F238E27FC236}">
-                <a16:creationId xmlns:a16="http://schemas.microsoft.com/office/drawing/2014/main" id="{BE114FD1-D7D6-4B43-8EA0-69F4EA31E9B7}"/>
+                <a16:creationId xmlns:a16="http://schemas.microsoft.com/office/drawing/2014/main" id="{18F9576A-7C0C-405C-83B0-A2C9C74FB3D2}"/>
               </a:ext>
             </a:extLst>
           </p:cNvPr>
@@ -8822,42 +9150,63 @@
           <a:p>
             <a:r>
               <a:rPr lang="en-GB" dirty="0"/>
-              <a:t>We learned how to work with the MEAN stack effectively and how to fully develop a full stack application</a:t>
+              <a:t>Allow user to login to application</a:t>
             </a:r>
           </a:p>
           <a:p>
             <a:r>
               <a:rPr lang="en-GB" dirty="0"/>
-              <a:t>We learned about UI design and how to create a good user experience</a:t>
+              <a:t>Allow user to purchase items from site</a:t>
             </a:r>
           </a:p>
           <a:p>
             <a:r>
               <a:rPr lang="en-GB" dirty="0"/>
-              <a:t>We learned how to work in a team and fix merge errors which occurred in the project repository</a:t>
+              <a:t>Allow user to enter and change information stored on site</a:t>
             </a:r>
           </a:p>
           <a:p>
             <a:r>
               <a:rPr lang="en-GB" dirty="0"/>
-              <a:t>We learned time-management skills</a:t>
+              <a:t>Allow user to create accounts</a:t>
             </a:r>
           </a:p>
           <a:p>
             <a:r>
               <a:rPr lang="en-GB" dirty="0"/>
-              <a:t>We learned how to manage projects and delegate work during the development of the project</a:t>
-            </a:r>
-          </a:p>
-          <a:p>
-            <a:endParaRPr lang="en-GB" dirty="0"/>
+              <a:t>Allow user to submit bugs with site</a:t>
+            </a:r>
+          </a:p>
+          <a:p>
+            <a:r>
+              <a:rPr lang="en-GB" dirty="0"/>
+              <a:t>Allow user to navigate site easily</a:t>
+            </a:r>
+          </a:p>
+          <a:p>
+            <a:r>
+              <a:rPr lang="en-GB" dirty="0"/>
+              <a:t>Make UI intuitive</a:t>
+            </a:r>
+          </a:p>
+          <a:p>
+            <a:r>
+              <a:rPr lang="en-GB" dirty="0"/>
+              <a:t>Allow user to navigate by category</a:t>
+            </a:r>
+          </a:p>
+          <a:p>
+            <a:r>
+              <a:rPr lang="en-GB" dirty="0"/>
+              <a:t>Gain a substantial knowledge of Full Stack development</a:t>
+            </a:r>
           </a:p>
         </p:txBody>
       </p:sp>
     </p:spTree>
     <p:extLst>
       <p:ext uri="{BB962C8B-B14F-4D97-AF65-F5344CB8AC3E}">
-        <p14:creationId xmlns:p14="http://schemas.microsoft.com/office/powerpoint/2010/main" val="1249355340"/>
+        <p14:creationId xmlns:p14="http://schemas.microsoft.com/office/powerpoint/2010/main" val="1528816674"/>
       </p:ext>
     </p:extLst>
   </p:cSld>
@@ -8889,7 +9238,7 @@
           <p:cNvPr id="2" name="Title 1">
             <a:extLst>
               <a:ext uri="{FF2B5EF4-FFF2-40B4-BE49-F238E27FC236}">
-                <a16:creationId xmlns:a16="http://schemas.microsoft.com/office/drawing/2014/main" id="{C18C8139-0834-4A5D-97AA-48E4ACEDB1EB}"/>
+                <a16:creationId xmlns:a16="http://schemas.microsoft.com/office/drawing/2014/main" id="{1BDDC55F-3E56-47AD-BAFE-067389819A86}"/>
               </a:ext>
             </a:extLst>
           </p:cNvPr>
@@ -8907,7 +9256,7 @@
           <a:p>
             <a:r>
               <a:rPr lang="en-GB" dirty="0"/>
-              <a:t>Skills learned	</a:t>
+              <a:t>Project Layout</a:t>
             </a:r>
           </a:p>
         </p:txBody>
@@ -8917,7 +9266,7 @@
           <p:cNvPr id="3" name="Content Placeholder 2">
             <a:extLst>
               <a:ext uri="{FF2B5EF4-FFF2-40B4-BE49-F238E27FC236}">
-                <a16:creationId xmlns:a16="http://schemas.microsoft.com/office/drawing/2014/main" id="{43B5CFF7-417B-4C3A-AFE5-E65275938EA2}"/>
+                <a16:creationId xmlns:a16="http://schemas.microsoft.com/office/drawing/2014/main" id="{0BFFA739-DCFD-49E3-81DE-041D127E8CD5}"/>
               </a:ext>
             </a:extLst>
           </p:cNvPr>
@@ -8933,49 +9282,14 @@
           <a:bodyPr/>
           <a:lstStyle/>
           <a:p>
-            <a:r>
-              <a:rPr lang="en-GB" dirty="0"/>
-              <a:t>We learned different terminology in angular</a:t>
-            </a:r>
-          </a:p>
-          <a:p>
-            <a:r>
-              <a:rPr lang="en-GB" dirty="0"/>
-              <a:t>We learned how to develop a backend to retrieve and get information from a database</a:t>
-            </a:r>
-          </a:p>
-          <a:p>
-            <a:r>
-              <a:rPr lang="en-GB" dirty="0"/>
-              <a:t>We improved our knowledge of Mongo and the MEAN stack in general</a:t>
-            </a:r>
-          </a:p>
-          <a:p>
-            <a:r>
-              <a:rPr lang="en-GB" dirty="0"/>
-              <a:t>We learned how to break a </a:t>
-            </a:r>
-            <a:r>
-              <a:rPr lang="en-GB" dirty="0" err="1"/>
-              <a:t>github</a:t>
-            </a:r>
-            <a:r>
-              <a:rPr lang="en-GB" dirty="0"/>
-              <a:t> repository into branches for a professional development environment</a:t>
-            </a:r>
-          </a:p>
-          <a:p>
-            <a:r>
-              <a:rPr lang="en-GB" dirty="0"/>
-              <a:t>We learned communication skills in the course of this module when discussing our progress with the supervisor</a:t>
-            </a:r>
+            <a:endParaRPr lang="en-GB"/>
           </a:p>
         </p:txBody>
       </p:sp>
     </p:spTree>
     <p:extLst>
       <p:ext uri="{BB962C8B-B14F-4D97-AF65-F5344CB8AC3E}">
-        <p14:creationId xmlns:p14="http://schemas.microsoft.com/office/powerpoint/2010/main" val="2743008040"/>
+        <p14:creationId xmlns:p14="http://schemas.microsoft.com/office/powerpoint/2010/main" val="488308725"/>
       </p:ext>
     </p:extLst>
   </p:cSld>

</xml_diff>

<commit_message>
Added new sections + project slides
Project slides up and added breakdown of work section as well as project insights.
</commit_message>
<xml_diff>
--- a/Presentation IT Professional.pptx
+++ b/Presentation IT Professional.pptx
@@ -14,11 +14,16 @@
     <p:sldId id="262" r:id="rId8"/>
     <p:sldId id="267" r:id="rId9"/>
     <p:sldId id="268" r:id="rId10"/>
-    <p:sldId id="269" r:id="rId11"/>
-    <p:sldId id="263" r:id="rId12"/>
-    <p:sldId id="264" r:id="rId13"/>
-    <p:sldId id="266" r:id="rId14"/>
-    <p:sldId id="265" r:id="rId15"/>
+    <p:sldId id="270" r:id="rId11"/>
+    <p:sldId id="269" r:id="rId12"/>
+    <p:sldId id="263" r:id="rId13"/>
+    <p:sldId id="264" r:id="rId14"/>
+    <p:sldId id="266" r:id="rId15"/>
+    <p:sldId id="265" r:id="rId16"/>
+    <p:sldId id="271" r:id="rId17"/>
+    <p:sldId id="272" r:id="rId18"/>
+    <p:sldId id="274" r:id="rId19"/>
+    <p:sldId id="273" r:id="rId20"/>
   </p:sldIdLst>
   <p:sldSz cx="12192000" cy="6858000"/>
   <p:notesSz cx="6858000" cy="9144000"/>
@@ -135,6 +140,7 @@
           <p14:sldIdLst>
             <p14:sldId id="267"/>
             <p14:sldId id="268"/>
+            <p14:sldId id="270"/>
             <p14:sldId id="269"/>
           </p14:sldIdLst>
         </p14:section>
@@ -144,6 +150,18 @@
             <p14:sldId id="264"/>
             <p14:sldId id="266"/>
             <p14:sldId id="265"/>
+          </p14:sldIdLst>
+        </p14:section>
+        <p14:section name="Breakdown of work" id="{AE17C121-BA34-4CE6-A423-9167F7AAB944}">
+          <p14:sldIdLst>
+            <p14:sldId id="271"/>
+            <p14:sldId id="272"/>
+            <p14:sldId id="274"/>
+          </p14:sldIdLst>
+        </p14:section>
+        <p14:section name="Github Insights" id="{A5AC11C3-EA3E-4321-82C2-AC34BADFEE9E}">
+          <p14:sldIdLst>
+            <p14:sldId id="273"/>
           </p14:sldIdLst>
         </p14:section>
       </p14:sectionLst>
@@ -343,7 +361,7 @@
           <a:p>
             <a:fld id="{2AD56B73-0521-4726-97BD-3F339B06B1E4}" type="datetimeFigureOut">
               <a:rPr lang="en-GB" smtClean="0"/>
-              <a:t>21/04/2019</a:t>
+              <a:t>27/04/2019</a:t>
             </a:fld>
             <a:endParaRPr lang="en-GB"/>
           </a:p>
@@ -681,7 +699,7 @@
           <a:p>
             <a:fld id="{2AD56B73-0521-4726-97BD-3F339B06B1E4}" type="datetimeFigureOut">
               <a:rPr lang="en-GB" smtClean="0"/>
-              <a:t>21/04/2019</a:t>
+              <a:t>27/04/2019</a:t>
             </a:fld>
             <a:endParaRPr lang="en-GB"/>
           </a:p>
@@ -1082,7 +1100,7 @@
           <a:p>
             <a:fld id="{2AD56B73-0521-4726-97BD-3F339B06B1E4}" type="datetimeFigureOut">
               <a:rPr lang="en-GB" smtClean="0"/>
-              <a:t>21/04/2019</a:t>
+              <a:t>27/04/2019</a:t>
             </a:fld>
             <a:endParaRPr lang="en-GB"/>
           </a:p>
@@ -1418,7 +1436,7 @@
           <a:p>
             <a:fld id="{2AD56B73-0521-4726-97BD-3F339B06B1E4}" type="datetimeFigureOut">
               <a:rPr lang="en-GB" smtClean="0"/>
-              <a:t>21/04/2019</a:t>
+              <a:t>27/04/2019</a:t>
             </a:fld>
             <a:endParaRPr lang="en-GB"/>
           </a:p>
@@ -1738,7 +1756,7 @@
           <a:p>
             <a:fld id="{2AD56B73-0521-4726-97BD-3F339B06B1E4}" type="datetimeFigureOut">
               <a:rPr lang="en-GB" smtClean="0"/>
-              <a:t>21/04/2019</a:t>
+              <a:t>27/04/2019</a:t>
             </a:fld>
             <a:endParaRPr lang="en-GB"/>
           </a:p>
@@ -2134,7 +2152,7 @@
           <a:p>
             <a:fld id="{2AD56B73-0521-4726-97BD-3F339B06B1E4}" type="datetimeFigureOut">
               <a:rPr lang="en-GB" smtClean="0"/>
-              <a:t>21/04/2019</a:t>
+              <a:t>27/04/2019</a:t>
             </a:fld>
             <a:endParaRPr lang="en-GB"/>
           </a:p>
@@ -2391,7 +2409,7 @@
           <a:p>
             <a:fld id="{2AD56B73-0521-4726-97BD-3F339B06B1E4}" type="datetimeFigureOut">
               <a:rPr lang="en-GB" smtClean="0"/>
-              <a:t>21/04/2019</a:t>
+              <a:t>27/04/2019</a:t>
             </a:fld>
             <a:endParaRPr lang="en-GB"/>
           </a:p>
@@ -2653,7 +2671,7 @@
           <a:p>
             <a:fld id="{2AD56B73-0521-4726-97BD-3F339B06B1E4}" type="datetimeFigureOut">
               <a:rPr lang="en-GB" smtClean="0"/>
-              <a:t>21/04/2019</a:t>
+              <a:t>27/04/2019</a:t>
             </a:fld>
             <a:endParaRPr lang="en-GB"/>
           </a:p>
@@ -2915,7 +2933,7 @@
           <a:p>
             <a:fld id="{2AD56B73-0521-4726-97BD-3F339B06B1E4}" type="datetimeFigureOut">
               <a:rPr lang="en-GB" smtClean="0"/>
-              <a:t>21/04/2019</a:t>
+              <a:t>27/04/2019</a:t>
             </a:fld>
             <a:endParaRPr lang="en-GB"/>
           </a:p>
@@ -3244,7 +3262,7 @@
           <a:p>
             <a:fld id="{2AD56B73-0521-4726-97BD-3F339B06B1E4}" type="datetimeFigureOut">
               <a:rPr lang="en-GB" smtClean="0"/>
-              <a:t>21/04/2019</a:t>
+              <a:t>27/04/2019</a:t>
             </a:fld>
             <a:endParaRPr lang="en-GB"/>
           </a:p>
@@ -3567,7 +3585,7 @@
           <a:p>
             <a:fld id="{2AD56B73-0521-4726-97BD-3F339B06B1E4}" type="datetimeFigureOut">
               <a:rPr lang="en-GB" smtClean="0"/>
-              <a:t>21/04/2019</a:t>
+              <a:t>27/04/2019</a:t>
             </a:fld>
             <a:endParaRPr lang="en-GB"/>
           </a:p>
@@ -4024,7 +4042,7 @@
           <a:p>
             <a:fld id="{2AD56B73-0521-4726-97BD-3F339B06B1E4}" type="datetimeFigureOut">
               <a:rPr lang="en-GB" smtClean="0"/>
-              <a:t>21/04/2019</a:t>
+              <a:t>27/04/2019</a:t>
             </a:fld>
             <a:endParaRPr lang="en-GB"/>
           </a:p>
@@ -4229,7 +4247,7 @@
           <a:p>
             <a:fld id="{2AD56B73-0521-4726-97BD-3F339B06B1E4}" type="datetimeFigureOut">
               <a:rPr lang="en-GB" smtClean="0"/>
-              <a:t>21/04/2019</a:t>
+              <a:t>27/04/2019</a:t>
             </a:fld>
             <a:endParaRPr lang="en-GB"/>
           </a:p>
@@ -4406,7 +4424,7 @@
           <a:p>
             <a:fld id="{2AD56B73-0521-4726-97BD-3F339B06B1E4}" type="datetimeFigureOut">
               <a:rPr lang="en-GB" smtClean="0"/>
-              <a:t>21/04/2019</a:t>
+              <a:t>27/04/2019</a:t>
             </a:fld>
             <a:endParaRPr lang="en-GB"/>
           </a:p>
@@ -4739,7 +4757,7 @@
           <a:p>
             <a:fld id="{2AD56B73-0521-4726-97BD-3F339B06B1E4}" type="datetimeFigureOut">
               <a:rPr lang="en-GB" smtClean="0"/>
-              <a:t>21/04/2019</a:t>
+              <a:t>27/04/2019</a:t>
             </a:fld>
             <a:endParaRPr lang="en-GB"/>
           </a:p>
@@ -5084,7 +5102,7 @@
           <a:p>
             <a:fld id="{2AD56B73-0521-4726-97BD-3F339B06B1E4}" type="datetimeFigureOut">
               <a:rPr lang="en-GB" smtClean="0"/>
-              <a:t>21/04/2019</a:t>
+              <a:t>27/04/2019</a:t>
             </a:fld>
             <a:endParaRPr lang="en-GB"/>
           </a:p>
@@ -7201,7 +7219,7 @@
           <a:p>
             <a:fld id="{2AD56B73-0521-4726-97BD-3F339B06B1E4}" type="datetimeFigureOut">
               <a:rPr lang="en-GB" smtClean="0"/>
-              <a:t>21/04/2019</a:t>
+              <a:t>27/04/2019</a:t>
             </a:fld>
             <a:endParaRPr lang="en-GB"/>
           </a:p>
@@ -7827,7 +7845,7 @@
           <p:cNvPr id="2" name="Title 1">
             <a:extLst>
               <a:ext uri="{FF2B5EF4-FFF2-40B4-BE49-F238E27FC236}">
-                <a16:creationId xmlns:a16="http://schemas.microsoft.com/office/drawing/2014/main" id="{D45B026C-DBC3-45BF-B29F-AAB02E4D869F}"/>
+                <a16:creationId xmlns:a16="http://schemas.microsoft.com/office/drawing/2014/main" id="{628D7516-DDBD-4AE8-B713-B7F3CD8AB6F0}"/>
               </a:ext>
             </a:extLst>
           </p:cNvPr>
@@ -7845,11 +7863,7 @@
           <a:p>
             <a:r>
               <a:rPr lang="en-GB" dirty="0"/>
-              <a:t>How we used </a:t>
-            </a:r>
-            <a:r>
-              <a:rPr lang="en-GB"/>
-              <a:t>project technologies</a:t>
+              <a:t>Project Layout Continued</a:t>
             </a:r>
           </a:p>
         </p:txBody>
@@ -7859,7 +7873,7 @@
           <p:cNvPr id="3" name="Content Placeholder 2">
             <a:extLst>
               <a:ext uri="{FF2B5EF4-FFF2-40B4-BE49-F238E27FC236}">
-                <a16:creationId xmlns:a16="http://schemas.microsoft.com/office/drawing/2014/main" id="{37DB055E-F5DE-4BEA-A19B-639FF2699AD6}"/>
+                <a16:creationId xmlns:a16="http://schemas.microsoft.com/office/drawing/2014/main" id="{3B77ECFB-5EBE-4082-AC3A-FF49DA1EBBB5}"/>
               </a:ext>
             </a:extLst>
           </p:cNvPr>
@@ -7875,14 +7889,69 @@
           <a:bodyPr/>
           <a:lstStyle/>
           <a:p>
-            <a:endParaRPr lang="en-GB"/>
+            <a:r>
+              <a:rPr lang="en-GB" dirty="0"/>
+              <a:t>Homepage: This is the home page shows pictures of items as well as toolbar and links under images</a:t>
+            </a:r>
+          </a:p>
+          <a:p>
+            <a:r>
+              <a:rPr lang="en-GB" dirty="0"/>
+              <a:t>Login page: allows user to enter username and password to login</a:t>
+            </a:r>
+          </a:p>
+          <a:p>
+            <a:r>
+              <a:rPr lang="en-GB" dirty="0"/>
+              <a:t>Outdoors: category page</a:t>
+            </a:r>
+          </a:p>
+          <a:p>
+            <a:r>
+              <a:rPr lang="en-GB" dirty="0"/>
+              <a:t>Register: Allows user to register account</a:t>
+            </a:r>
+          </a:p>
+          <a:p>
+            <a:r>
+              <a:rPr lang="en-GB" dirty="0"/>
+              <a:t>Sports: category page</a:t>
+            </a:r>
+          </a:p>
+          <a:p>
+            <a:r>
+              <a:rPr lang="en-GB" dirty="0"/>
+              <a:t>Support: allows user to submit bugs with site to dev team</a:t>
+            </a:r>
+          </a:p>
+          <a:p>
+            <a:r>
+              <a:rPr lang="en-GB" dirty="0"/>
+              <a:t>In addition to components we use services to push or retrieve information from server: cart service, authentication service, </a:t>
+            </a:r>
+            <a:r>
+              <a:rPr lang="en-GB" dirty="0" err="1"/>
+              <a:t>bugpost</a:t>
+            </a:r>
+            <a:r>
+              <a:rPr lang="en-GB" dirty="0"/>
+              <a:t> service, register service, retrieve </a:t>
+            </a:r>
+            <a:r>
+              <a:rPr lang="en-GB" dirty="0" err="1"/>
+              <a:t>service,product</a:t>
+            </a:r>
+            <a:r>
+              <a:rPr lang="en-GB" dirty="0"/>
+              <a:t> service</a:t>
+            </a:r>
           </a:p>
         </p:txBody>
       </p:sp>
     </p:spTree>
     <p:extLst>
       <p:ext uri="{BB962C8B-B14F-4D97-AF65-F5344CB8AC3E}">
-        <p14:creationId xmlns:p14="http://schemas.microsoft.com/office/powerpoint/2010/main" val="1558232998"/>
+        <p14:creationId xmlns:p14="http://schemas.microsoft.com/office/powerpoint/2010/main" val="2314101152"/>
       </p:ext>
     </p:extLst>
   </p:cSld>
@@ -7914,7 +7983,7 @@
           <p:cNvPr id="2" name="Title 1">
             <a:extLst>
               <a:ext uri="{FF2B5EF4-FFF2-40B4-BE49-F238E27FC236}">
-                <a16:creationId xmlns:a16="http://schemas.microsoft.com/office/drawing/2014/main" id="{E65B0746-D04D-4708-A679-7A1A92BB4FD1}"/>
+                <a16:creationId xmlns:a16="http://schemas.microsoft.com/office/drawing/2014/main" id="{D45B026C-DBC3-45BF-B29F-AAB02E4D869F}"/>
               </a:ext>
             </a:extLst>
           </p:cNvPr>
@@ -7932,7 +8001,11 @@
           <a:p>
             <a:r>
               <a:rPr lang="en-GB" dirty="0"/>
-              <a:t>What we learned	</a:t>
+              <a:t>How we used </a:t>
+            </a:r>
+            <a:r>
+              <a:rPr lang="en-GB"/>
+              <a:t>project technologies</a:t>
             </a:r>
           </a:p>
         </p:txBody>
@@ -7942,7 +8015,7 @@
           <p:cNvPr id="3" name="Content Placeholder 2">
             <a:extLst>
               <a:ext uri="{FF2B5EF4-FFF2-40B4-BE49-F238E27FC236}">
-                <a16:creationId xmlns:a16="http://schemas.microsoft.com/office/drawing/2014/main" id="{BE114FD1-D7D6-4B43-8EA0-69F4EA31E9B7}"/>
+                <a16:creationId xmlns:a16="http://schemas.microsoft.com/office/drawing/2014/main" id="{37DB055E-F5DE-4BEA-A19B-639FF2699AD6}"/>
               </a:ext>
             </a:extLst>
           </p:cNvPr>
@@ -7960,42 +8033,41 @@
           <a:p>
             <a:r>
               <a:rPr lang="en-GB" dirty="0"/>
-              <a:t>We learned how to work with the MEAN stack effectively and how to fully develop a full stack application</a:t>
-            </a:r>
-          </a:p>
-          <a:p>
-            <a:r>
-              <a:rPr lang="en-GB" dirty="0"/>
-              <a:t>We learned about UI design and how to create a good user experience</a:t>
-            </a:r>
-          </a:p>
-          <a:p>
-            <a:r>
-              <a:rPr lang="en-GB" dirty="0"/>
-              <a:t>We learned how to work in a team and fix merge errors which occurred in the project repository</a:t>
-            </a:r>
-          </a:p>
-          <a:p>
-            <a:r>
-              <a:rPr lang="en-GB" dirty="0"/>
-              <a:t>We learned time-management skills</a:t>
-            </a:r>
-          </a:p>
-          <a:p>
-            <a:r>
-              <a:rPr lang="en-GB" dirty="0"/>
-              <a:t>We learned how to manage projects and delegate work during the development of the project</a:t>
-            </a:r>
-          </a:p>
-          <a:p>
-            <a:endParaRPr lang="en-GB" dirty="0"/>
+              <a:t>We used Mongo to define schemas for the items and </a:t>
+            </a:r>
+            <a:r>
+              <a:rPr lang="en-GB" dirty="0" err="1"/>
+              <a:t>Mlab</a:t>
+            </a:r>
+            <a:r>
+              <a:rPr lang="en-GB" dirty="0"/>
+              <a:t> to store the items in an online Database.</a:t>
+            </a:r>
+          </a:p>
+          <a:p>
+            <a:r>
+              <a:rPr lang="en-GB" dirty="0"/>
+              <a:t>We used Node and Express to push and retrieve information to and from the server</a:t>
+            </a:r>
+          </a:p>
+          <a:p>
+            <a:r>
+              <a:rPr lang="en-GB" dirty="0"/>
+              <a:t>We used Angular to code up the functions for pushing and retrieving information to and from the application to the server</a:t>
+            </a:r>
+          </a:p>
+          <a:p>
+            <a:r>
+              <a:rPr lang="en-GB" dirty="0"/>
+              <a:t>We used HTML and SCSS to code up the HTML pages and style them.</a:t>
+            </a:r>
           </a:p>
         </p:txBody>
       </p:sp>
     </p:spTree>
     <p:extLst>
       <p:ext uri="{BB962C8B-B14F-4D97-AF65-F5344CB8AC3E}">
-        <p14:creationId xmlns:p14="http://schemas.microsoft.com/office/powerpoint/2010/main" val="1249355340"/>
+        <p14:creationId xmlns:p14="http://schemas.microsoft.com/office/powerpoint/2010/main" val="1558232998"/>
       </p:ext>
     </p:extLst>
   </p:cSld>
@@ -8027,7 +8099,7 @@
           <p:cNvPr id="2" name="Title 1">
             <a:extLst>
               <a:ext uri="{FF2B5EF4-FFF2-40B4-BE49-F238E27FC236}">
-                <a16:creationId xmlns:a16="http://schemas.microsoft.com/office/drawing/2014/main" id="{C18C8139-0834-4A5D-97AA-48E4ACEDB1EB}"/>
+                <a16:creationId xmlns:a16="http://schemas.microsoft.com/office/drawing/2014/main" id="{E65B0746-D04D-4708-A679-7A1A92BB4FD1}"/>
               </a:ext>
             </a:extLst>
           </p:cNvPr>
@@ -8045,7 +8117,7 @@
           <a:p>
             <a:r>
               <a:rPr lang="en-GB" dirty="0"/>
-              <a:t>Skills learned	</a:t>
+              <a:t>What we learned	</a:t>
             </a:r>
           </a:p>
         </p:txBody>
@@ -8055,7 +8127,7 @@
           <p:cNvPr id="3" name="Content Placeholder 2">
             <a:extLst>
               <a:ext uri="{FF2B5EF4-FFF2-40B4-BE49-F238E27FC236}">
-                <a16:creationId xmlns:a16="http://schemas.microsoft.com/office/drawing/2014/main" id="{43B5CFF7-417B-4C3A-AFE5-E65275938EA2}"/>
+                <a16:creationId xmlns:a16="http://schemas.microsoft.com/office/drawing/2014/main" id="{BE114FD1-D7D6-4B43-8EA0-69F4EA31E9B7}"/>
               </a:ext>
             </a:extLst>
           </p:cNvPr>
@@ -8073,47 +8145,42 @@
           <a:p>
             <a:r>
               <a:rPr lang="en-GB" dirty="0"/>
-              <a:t>We learned different terminology in angular</a:t>
-            </a:r>
-          </a:p>
-          <a:p>
-            <a:r>
-              <a:rPr lang="en-GB" dirty="0"/>
-              <a:t>We learned how to develop a backend to retrieve and get information from a database</a:t>
-            </a:r>
-          </a:p>
-          <a:p>
-            <a:r>
-              <a:rPr lang="en-GB" dirty="0"/>
-              <a:t>We improved our knowledge of Mongo and the MEAN stack in general</a:t>
-            </a:r>
-          </a:p>
-          <a:p>
-            <a:r>
-              <a:rPr lang="en-GB" dirty="0"/>
-              <a:t>We learned how to break a </a:t>
-            </a:r>
-            <a:r>
-              <a:rPr lang="en-GB" dirty="0" err="1"/>
-              <a:t>github</a:t>
-            </a:r>
-            <a:r>
-              <a:rPr lang="en-GB" dirty="0"/>
-              <a:t> repository into branches for a professional development environment</a:t>
-            </a:r>
-          </a:p>
-          <a:p>
-            <a:r>
-              <a:rPr lang="en-GB" dirty="0"/>
-              <a:t>We learned communication skills in the course of this module when discussing our progress with the supervisor</a:t>
-            </a:r>
+              <a:t>We learned how to work with the MEAN stack effectively and how to fully develop a full stack application</a:t>
+            </a:r>
+          </a:p>
+          <a:p>
+            <a:r>
+              <a:rPr lang="en-GB" dirty="0"/>
+              <a:t>We learned about UI design and how to create a good user experience</a:t>
+            </a:r>
+          </a:p>
+          <a:p>
+            <a:r>
+              <a:rPr lang="en-GB" dirty="0"/>
+              <a:t>We learned how to work in a team and fix merge errors which occurred in the project repository</a:t>
+            </a:r>
+          </a:p>
+          <a:p>
+            <a:r>
+              <a:rPr lang="en-GB" dirty="0"/>
+              <a:t>We learned time-management skills</a:t>
+            </a:r>
+          </a:p>
+          <a:p>
+            <a:r>
+              <a:rPr lang="en-GB" dirty="0"/>
+              <a:t>We learned how to manage projects and delegate work during the development of the project</a:t>
+            </a:r>
+          </a:p>
+          <a:p>
+            <a:endParaRPr lang="en-GB" dirty="0"/>
           </a:p>
         </p:txBody>
       </p:sp>
     </p:spTree>
     <p:extLst>
       <p:ext uri="{BB962C8B-B14F-4D97-AF65-F5344CB8AC3E}">
-        <p14:creationId xmlns:p14="http://schemas.microsoft.com/office/powerpoint/2010/main" val="2743008040"/>
+        <p14:creationId xmlns:p14="http://schemas.microsoft.com/office/powerpoint/2010/main" val="1249355340"/>
       </p:ext>
     </p:extLst>
   </p:cSld>
@@ -8145,7 +8212,7 @@
           <p:cNvPr id="2" name="Title 1">
             <a:extLst>
               <a:ext uri="{FF2B5EF4-FFF2-40B4-BE49-F238E27FC236}">
-                <a16:creationId xmlns:a16="http://schemas.microsoft.com/office/drawing/2014/main" id="{9865FCFC-9E25-4808-8C7E-328E0ECD7D70}"/>
+                <a16:creationId xmlns:a16="http://schemas.microsoft.com/office/drawing/2014/main" id="{C18C8139-0834-4A5D-97AA-48E4ACEDB1EB}"/>
               </a:ext>
             </a:extLst>
           </p:cNvPr>
@@ -8163,7 +8230,7 @@
           <a:p>
             <a:r>
               <a:rPr lang="en-GB" dirty="0"/>
-              <a:t>Difficulties we ran into 	</a:t>
+              <a:t>Skills learned	</a:t>
             </a:r>
           </a:p>
         </p:txBody>
@@ -8173,7 +8240,7 @@
           <p:cNvPr id="3" name="Content Placeholder 2">
             <a:extLst>
               <a:ext uri="{FF2B5EF4-FFF2-40B4-BE49-F238E27FC236}">
-                <a16:creationId xmlns:a16="http://schemas.microsoft.com/office/drawing/2014/main" id="{2331F9DB-C529-4EBC-B868-3F5F1669F702}"/>
+                <a16:creationId xmlns:a16="http://schemas.microsoft.com/office/drawing/2014/main" id="{43B5CFF7-417B-4C3A-AFE5-E65275938EA2}"/>
               </a:ext>
             </a:extLst>
           </p:cNvPr>
@@ -8191,19 +8258,39 @@
           <a:p>
             <a:r>
               <a:rPr lang="en-GB" dirty="0"/>
-              <a:t>Time management was difficult as a lot of work goes into maintaining a good work ethic and developing complex functionality for an ecommerce site</a:t>
-            </a:r>
-          </a:p>
-          <a:p>
-            <a:r>
-              <a:rPr lang="en-GB" dirty="0"/>
-              <a:t>Merge errors occurred a decent amount as it is almost impossible to avoid merge errors in a group project</a:t>
-            </a:r>
-          </a:p>
-          <a:p>
-            <a:r>
-              <a:rPr lang="en-GB" dirty="0"/>
-              <a:t>Relearning angular and improving our knowledge of mongo and angular was difficult at the start as we had to remember and improve our knowledge of the technology</a:t>
+              <a:t>We learned different terminology in angular</a:t>
+            </a:r>
+          </a:p>
+          <a:p>
+            <a:r>
+              <a:rPr lang="en-GB" dirty="0"/>
+              <a:t>We learned how to develop a backend to retrieve and get information from a database</a:t>
+            </a:r>
+          </a:p>
+          <a:p>
+            <a:r>
+              <a:rPr lang="en-GB" dirty="0"/>
+              <a:t>We improved our knowledge of Mongo and the MEAN stack in general</a:t>
+            </a:r>
+          </a:p>
+          <a:p>
+            <a:r>
+              <a:rPr lang="en-GB" dirty="0"/>
+              <a:t>We learned how to break a </a:t>
+            </a:r>
+            <a:r>
+              <a:rPr lang="en-GB" dirty="0" err="1"/>
+              <a:t>github</a:t>
+            </a:r>
+            <a:r>
+              <a:rPr lang="en-GB" dirty="0"/>
+              <a:t> repository into branches for a professional development environment</a:t>
+            </a:r>
+          </a:p>
+          <a:p>
+            <a:r>
+              <a:rPr lang="en-GB" dirty="0"/>
+              <a:t>We learned communication skills in the course of this module when discussing our progress with the supervisor</a:t>
             </a:r>
           </a:p>
         </p:txBody>
@@ -8211,7 +8298,7 @@
     </p:spTree>
     <p:extLst>
       <p:ext uri="{BB962C8B-B14F-4D97-AF65-F5344CB8AC3E}">
-        <p14:creationId xmlns:p14="http://schemas.microsoft.com/office/powerpoint/2010/main" val="1744646622"/>
+        <p14:creationId xmlns:p14="http://schemas.microsoft.com/office/powerpoint/2010/main" val="2743008040"/>
       </p:ext>
     </p:extLst>
   </p:cSld>
@@ -8243,6 +8330,104 @@
           <p:cNvPr id="2" name="Title 1">
             <a:extLst>
               <a:ext uri="{FF2B5EF4-FFF2-40B4-BE49-F238E27FC236}">
+                <a16:creationId xmlns:a16="http://schemas.microsoft.com/office/drawing/2014/main" id="{9865FCFC-9E25-4808-8C7E-328E0ECD7D70}"/>
+              </a:ext>
+            </a:extLst>
+          </p:cNvPr>
+          <p:cNvSpPr>
+            <a:spLocks noGrp="1"/>
+          </p:cNvSpPr>
+          <p:nvPr>
+            <p:ph type="title"/>
+          </p:nvPr>
+        </p:nvSpPr>
+        <p:spPr/>
+        <p:txBody>
+          <a:bodyPr/>
+          <a:lstStyle/>
+          <a:p>
+            <a:r>
+              <a:rPr lang="en-GB" dirty="0"/>
+              <a:t>Difficulties we ran into 	</a:t>
+            </a:r>
+          </a:p>
+        </p:txBody>
+      </p:sp>
+      <p:sp>
+        <p:nvSpPr>
+          <p:cNvPr id="3" name="Content Placeholder 2">
+            <a:extLst>
+              <a:ext uri="{FF2B5EF4-FFF2-40B4-BE49-F238E27FC236}">
+                <a16:creationId xmlns:a16="http://schemas.microsoft.com/office/drawing/2014/main" id="{2331F9DB-C529-4EBC-B868-3F5F1669F702}"/>
+              </a:ext>
+            </a:extLst>
+          </p:cNvPr>
+          <p:cNvSpPr>
+            <a:spLocks noGrp="1"/>
+          </p:cNvSpPr>
+          <p:nvPr>
+            <p:ph idx="1"/>
+          </p:nvPr>
+        </p:nvSpPr>
+        <p:spPr/>
+        <p:txBody>
+          <a:bodyPr/>
+          <a:lstStyle/>
+          <a:p>
+            <a:r>
+              <a:rPr lang="en-GB" dirty="0"/>
+              <a:t>Time management was difficult as a lot of work goes into maintaining a good work ethic and developing complex functionality for an ecommerce site</a:t>
+            </a:r>
+          </a:p>
+          <a:p>
+            <a:r>
+              <a:rPr lang="en-GB" dirty="0"/>
+              <a:t>Merge errors occurred a decent amount as it is almost impossible to avoid merge errors in a group project</a:t>
+            </a:r>
+          </a:p>
+          <a:p>
+            <a:r>
+              <a:rPr lang="en-GB" dirty="0"/>
+              <a:t>Relearning angular and improving our knowledge of mongo and angular was difficult at the start as we had to remember and improve our knowledge of the technology</a:t>
+            </a:r>
+          </a:p>
+        </p:txBody>
+      </p:sp>
+    </p:spTree>
+    <p:extLst>
+      <p:ext uri="{BB962C8B-B14F-4D97-AF65-F5344CB8AC3E}">
+        <p14:creationId xmlns:p14="http://schemas.microsoft.com/office/powerpoint/2010/main" val="1744646622"/>
+      </p:ext>
+    </p:extLst>
+  </p:cSld>
+  <p:clrMapOvr>
+    <a:masterClrMapping/>
+  </p:clrMapOvr>
+</p:sld>
+</file>
+
+<file path=ppt/slides/slide15.xml><?xml version="1.0" encoding="utf-8"?>
+<p:sld xmlns:a="http://schemas.openxmlformats.org/drawingml/2006/main" xmlns:r="http://schemas.openxmlformats.org/officeDocument/2006/relationships" xmlns:p="http://schemas.openxmlformats.org/presentationml/2006/main">
+  <p:cSld>
+    <p:spTree>
+      <p:nvGrpSpPr>
+        <p:cNvPr id="1" name=""/>
+        <p:cNvGrpSpPr/>
+        <p:nvPr/>
+      </p:nvGrpSpPr>
+      <p:grpSpPr>
+        <a:xfrm>
+          <a:off x="0" y="0"/>
+          <a:ext cx="0" cy="0"/>
+          <a:chOff x="0" y="0"/>
+          <a:chExt cx="0" cy="0"/>
+        </a:xfrm>
+      </p:grpSpPr>
+      <p:sp>
+        <p:nvSpPr>
+          <p:cNvPr id="2" name="Title 1">
+            <a:extLst>
+              <a:ext uri="{FF2B5EF4-FFF2-40B4-BE49-F238E27FC236}">
                 <a16:creationId xmlns:a16="http://schemas.microsoft.com/office/drawing/2014/main" id="{B392BC85-3A3A-4D7F-916C-EF5D3CCBBE17}"/>
               </a:ext>
             </a:extLst>
@@ -8316,6 +8501,458 @@
     <p:extLst>
       <p:ext uri="{BB962C8B-B14F-4D97-AF65-F5344CB8AC3E}">
         <p14:creationId xmlns:p14="http://schemas.microsoft.com/office/powerpoint/2010/main" val="4245027484"/>
+      </p:ext>
+    </p:extLst>
+  </p:cSld>
+  <p:clrMapOvr>
+    <a:masterClrMapping/>
+  </p:clrMapOvr>
+</p:sld>
+</file>
+
+<file path=ppt/slides/slide16.xml><?xml version="1.0" encoding="utf-8"?>
+<p:sld xmlns:a="http://schemas.openxmlformats.org/drawingml/2006/main" xmlns:r="http://schemas.openxmlformats.org/officeDocument/2006/relationships" xmlns:p="http://schemas.openxmlformats.org/presentationml/2006/main">
+  <p:cSld>
+    <p:spTree>
+      <p:nvGrpSpPr>
+        <p:cNvPr id="1" name=""/>
+        <p:cNvGrpSpPr/>
+        <p:nvPr/>
+      </p:nvGrpSpPr>
+      <p:grpSpPr>
+        <a:xfrm>
+          <a:off x="0" y="0"/>
+          <a:ext cx="0" cy="0"/>
+          <a:chOff x="0" y="0"/>
+          <a:chExt cx="0" cy="0"/>
+        </a:xfrm>
+      </p:grpSpPr>
+      <p:sp>
+        <p:nvSpPr>
+          <p:cNvPr id="2" name="Title 1">
+            <a:extLst>
+              <a:ext uri="{FF2B5EF4-FFF2-40B4-BE49-F238E27FC236}">
+                <a16:creationId xmlns:a16="http://schemas.microsoft.com/office/drawing/2014/main" id="{E4157E1C-7294-4D21-B193-72A3F3A6C152}"/>
+              </a:ext>
+            </a:extLst>
+          </p:cNvPr>
+          <p:cNvSpPr>
+            <a:spLocks noGrp="1"/>
+          </p:cNvSpPr>
+          <p:nvPr>
+            <p:ph type="title"/>
+          </p:nvPr>
+        </p:nvSpPr>
+        <p:spPr/>
+        <p:txBody>
+          <a:bodyPr/>
+          <a:lstStyle/>
+          <a:p>
+            <a:r>
+              <a:rPr lang="en-GB" dirty="0"/>
+              <a:t>What I did – </a:t>
+            </a:r>
+            <a:r>
+              <a:rPr lang="en-GB" dirty="0" err="1"/>
+              <a:t>Ultan</a:t>
+            </a:r>
+            <a:r>
+              <a:rPr lang="en-GB" dirty="0"/>
+              <a:t> Kearns G00343745	</a:t>
+            </a:r>
+          </a:p>
+        </p:txBody>
+      </p:sp>
+      <p:sp>
+        <p:nvSpPr>
+          <p:cNvPr id="3" name="Content Placeholder 2">
+            <a:extLst>
+              <a:ext uri="{FF2B5EF4-FFF2-40B4-BE49-F238E27FC236}">
+                <a16:creationId xmlns:a16="http://schemas.microsoft.com/office/drawing/2014/main" id="{5227EAD1-DE8B-4688-9DC1-8B5AECFDE53F}"/>
+              </a:ext>
+            </a:extLst>
+          </p:cNvPr>
+          <p:cNvSpPr>
+            <a:spLocks noGrp="1"/>
+          </p:cNvSpPr>
+          <p:nvPr>
+            <p:ph idx="1"/>
+          </p:nvPr>
+        </p:nvSpPr>
+        <p:spPr/>
+        <p:txBody>
+          <a:bodyPr>
+            <a:normAutofit lnSpcReduction="10000"/>
+          </a:bodyPr>
+          <a:lstStyle/>
+          <a:p>
+            <a:r>
+              <a:rPr lang="en-GB" dirty="0"/>
+              <a:t>Got routing working</a:t>
+            </a:r>
+          </a:p>
+          <a:p>
+            <a:r>
+              <a:rPr lang="en-GB" dirty="0"/>
+              <a:t>Wrote retrieval service for all items to retrieve items from DB</a:t>
+            </a:r>
+          </a:p>
+          <a:p>
+            <a:r>
+              <a:rPr lang="en-GB" dirty="0"/>
+              <a:t>Got authentication working – for login</a:t>
+            </a:r>
+          </a:p>
+          <a:p>
+            <a:r>
+              <a:rPr lang="en-GB" dirty="0"/>
+              <a:t>Styled items pages and populated with items data based on category</a:t>
+            </a:r>
+          </a:p>
+          <a:p>
+            <a:r>
+              <a:rPr lang="en-GB" dirty="0"/>
+              <a:t>Got authentication working</a:t>
+            </a:r>
+          </a:p>
+          <a:p>
+            <a:r>
+              <a:rPr lang="en-GB" dirty="0"/>
+              <a:t>All support page both creation of bugs on DB and layout</a:t>
+            </a:r>
+          </a:p>
+          <a:p>
+            <a:r>
+              <a:rPr lang="en-GB" dirty="0"/>
+              <a:t>Register page both layout and creation of users on DB</a:t>
+            </a:r>
+          </a:p>
+          <a:p>
+            <a:r>
+              <a:rPr lang="en-GB" dirty="0"/>
+              <a:t>Got forgot page working both sending emails and layout</a:t>
+            </a:r>
+          </a:p>
+          <a:p>
+            <a:r>
+              <a:rPr lang="en-GB" dirty="0"/>
+              <a:t>Styled application by adding margins to buttons and using angular mat-materials</a:t>
+            </a:r>
+          </a:p>
+        </p:txBody>
+      </p:sp>
+    </p:spTree>
+    <p:extLst>
+      <p:ext uri="{BB962C8B-B14F-4D97-AF65-F5344CB8AC3E}">
+        <p14:creationId xmlns:p14="http://schemas.microsoft.com/office/powerpoint/2010/main" val="3012898289"/>
+      </p:ext>
+    </p:extLst>
+  </p:cSld>
+  <p:clrMapOvr>
+    <a:masterClrMapping/>
+  </p:clrMapOvr>
+</p:sld>
+</file>
+
+<file path=ppt/slides/slide17.xml><?xml version="1.0" encoding="utf-8"?>
+<p:sld xmlns:a="http://schemas.openxmlformats.org/drawingml/2006/main" xmlns:r="http://schemas.openxmlformats.org/officeDocument/2006/relationships" xmlns:p="http://schemas.openxmlformats.org/presentationml/2006/main">
+  <p:cSld>
+    <p:spTree>
+      <p:nvGrpSpPr>
+        <p:cNvPr id="1" name=""/>
+        <p:cNvGrpSpPr/>
+        <p:nvPr/>
+      </p:nvGrpSpPr>
+      <p:grpSpPr>
+        <a:xfrm>
+          <a:off x="0" y="0"/>
+          <a:ext cx="0" cy="0"/>
+          <a:chOff x="0" y="0"/>
+          <a:chExt cx="0" cy="0"/>
+        </a:xfrm>
+      </p:grpSpPr>
+      <p:sp>
+        <p:nvSpPr>
+          <p:cNvPr id="2" name="Title 1">
+            <a:extLst>
+              <a:ext uri="{FF2B5EF4-FFF2-40B4-BE49-F238E27FC236}">
+                <a16:creationId xmlns:a16="http://schemas.microsoft.com/office/drawing/2014/main" id="{4F45F4B7-6D97-45BA-82F3-31CC2C76C679}"/>
+              </a:ext>
+            </a:extLst>
+          </p:cNvPr>
+          <p:cNvSpPr>
+            <a:spLocks noGrp="1"/>
+          </p:cNvSpPr>
+          <p:nvPr>
+            <p:ph type="title"/>
+          </p:nvPr>
+        </p:nvSpPr>
+        <p:spPr/>
+        <p:txBody>
+          <a:bodyPr/>
+          <a:lstStyle/>
+          <a:p>
+            <a:r>
+              <a:rPr lang="en-GB" dirty="0"/>
+              <a:t>What I did – </a:t>
+            </a:r>
+            <a:r>
+              <a:rPr lang="en-GB" dirty="0" err="1"/>
+              <a:t>Ultan</a:t>
+            </a:r>
+            <a:r>
+              <a:rPr lang="en-GB" dirty="0"/>
+              <a:t> contd.</a:t>
+            </a:r>
+            <a:br>
+              <a:rPr lang="en-GB" dirty="0"/>
+            </a:br>
+            <a:endParaRPr lang="en-GB" dirty="0"/>
+          </a:p>
+        </p:txBody>
+      </p:sp>
+      <p:sp>
+        <p:nvSpPr>
+          <p:cNvPr id="3" name="Content Placeholder 2">
+            <a:extLst>
+              <a:ext uri="{FF2B5EF4-FFF2-40B4-BE49-F238E27FC236}">
+                <a16:creationId xmlns:a16="http://schemas.microsoft.com/office/drawing/2014/main" id="{EDFA153F-D05C-4F2C-9A9B-93A349AC380F}"/>
+              </a:ext>
+            </a:extLst>
+          </p:cNvPr>
+          <p:cNvSpPr>
+            <a:spLocks noGrp="1"/>
+          </p:cNvSpPr>
+          <p:nvPr>
+            <p:ph idx="1"/>
+          </p:nvPr>
+        </p:nvSpPr>
+        <p:spPr/>
+        <p:txBody>
+          <a:bodyPr/>
+          <a:lstStyle/>
+          <a:p>
+            <a:r>
+              <a:rPr lang="en-GB" dirty="0"/>
+              <a:t>Added models for bug and user to define the layout of bug and user objects</a:t>
+            </a:r>
+          </a:p>
+          <a:p>
+            <a:r>
+              <a:rPr lang="en-GB" dirty="0"/>
+              <a:t>Wrote </a:t>
+            </a:r>
+            <a:r>
+              <a:rPr lang="en-GB" dirty="0" err="1"/>
+              <a:t>bugpost</a:t>
+            </a:r>
+            <a:r>
+              <a:rPr lang="en-GB" dirty="0"/>
+              <a:t>, retrieval and register services.</a:t>
+            </a:r>
+          </a:p>
+          <a:p>
+            <a:r>
+              <a:rPr lang="en-GB" dirty="0"/>
+              <a:t>Added links + items to homepage also styled</a:t>
+            </a:r>
+          </a:p>
+          <a:p>
+            <a:r>
+              <a:rPr lang="en-GB" dirty="0"/>
+              <a:t>Added links to deal page</a:t>
+            </a:r>
+          </a:p>
+        </p:txBody>
+      </p:sp>
+    </p:spTree>
+    <p:extLst>
+      <p:ext uri="{BB962C8B-B14F-4D97-AF65-F5344CB8AC3E}">
+        <p14:creationId xmlns:p14="http://schemas.microsoft.com/office/powerpoint/2010/main" val="764148011"/>
+      </p:ext>
+    </p:extLst>
+  </p:cSld>
+  <p:clrMapOvr>
+    <a:masterClrMapping/>
+  </p:clrMapOvr>
+</p:sld>
+</file>
+
+<file path=ppt/slides/slide18.xml><?xml version="1.0" encoding="utf-8"?>
+<p:sld xmlns:a="http://schemas.openxmlformats.org/drawingml/2006/main" xmlns:r="http://schemas.openxmlformats.org/officeDocument/2006/relationships" xmlns:p="http://schemas.openxmlformats.org/presentationml/2006/main">
+  <p:cSld>
+    <p:spTree>
+      <p:nvGrpSpPr>
+        <p:cNvPr id="1" name=""/>
+        <p:cNvGrpSpPr/>
+        <p:nvPr/>
+      </p:nvGrpSpPr>
+      <p:grpSpPr>
+        <a:xfrm>
+          <a:off x="0" y="0"/>
+          <a:ext cx="0" cy="0"/>
+          <a:chOff x="0" y="0"/>
+          <a:chExt cx="0" cy="0"/>
+        </a:xfrm>
+      </p:grpSpPr>
+      <p:sp>
+        <p:nvSpPr>
+          <p:cNvPr id="2" name="Title 1">
+            <a:extLst>
+              <a:ext uri="{FF2B5EF4-FFF2-40B4-BE49-F238E27FC236}">
+                <a16:creationId xmlns:a16="http://schemas.microsoft.com/office/drawing/2014/main" id="{07E5155A-BD0D-44CB-BAB8-1D83FA3EE92C}"/>
+              </a:ext>
+            </a:extLst>
+          </p:cNvPr>
+          <p:cNvSpPr>
+            <a:spLocks noGrp="1"/>
+          </p:cNvSpPr>
+          <p:nvPr>
+            <p:ph type="title"/>
+          </p:nvPr>
+        </p:nvSpPr>
+        <p:spPr/>
+        <p:txBody>
+          <a:bodyPr/>
+          <a:lstStyle/>
+          <a:p>
+            <a:r>
+              <a:rPr lang="en-GB" dirty="0"/>
+              <a:t>What I did – </a:t>
+            </a:r>
+            <a:r>
+              <a:rPr lang="en-GB"/>
+              <a:t>Ross Heaney</a:t>
+            </a:r>
+          </a:p>
+        </p:txBody>
+      </p:sp>
+      <p:sp>
+        <p:nvSpPr>
+          <p:cNvPr id="3" name="Content Placeholder 2">
+            <a:extLst>
+              <a:ext uri="{FF2B5EF4-FFF2-40B4-BE49-F238E27FC236}">
+                <a16:creationId xmlns:a16="http://schemas.microsoft.com/office/drawing/2014/main" id="{87A23A92-2464-45CD-998C-9A4520731993}"/>
+              </a:ext>
+            </a:extLst>
+          </p:cNvPr>
+          <p:cNvSpPr>
+            <a:spLocks noGrp="1"/>
+          </p:cNvSpPr>
+          <p:nvPr>
+            <p:ph idx="1"/>
+          </p:nvPr>
+        </p:nvSpPr>
+        <p:spPr/>
+        <p:txBody>
+          <a:bodyPr/>
+          <a:lstStyle/>
+          <a:p>
+            <a:endParaRPr lang="en-GB"/>
+          </a:p>
+        </p:txBody>
+      </p:sp>
+    </p:spTree>
+    <p:extLst>
+      <p:ext uri="{BB962C8B-B14F-4D97-AF65-F5344CB8AC3E}">
+        <p14:creationId xmlns:p14="http://schemas.microsoft.com/office/powerpoint/2010/main" val="237903851"/>
+      </p:ext>
+    </p:extLst>
+  </p:cSld>
+  <p:clrMapOvr>
+    <a:masterClrMapping/>
+  </p:clrMapOvr>
+</p:sld>
+</file>
+
+<file path=ppt/slides/slide19.xml><?xml version="1.0" encoding="utf-8"?>
+<p:sld xmlns:a="http://schemas.openxmlformats.org/drawingml/2006/main" xmlns:r="http://schemas.openxmlformats.org/officeDocument/2006/relationships" xmlns:p="http://schemas.openxmlformats.org/presentationml/2006/main">
+  <p:cSld>
+    <p:spTree>
+      <p:nvGrpSpPr>
+        <p:cNvPr id="1" name=""/>
+        <p:cNvGrpSpPr/>
+        <p:nvPr/>
+      </p:nvGrpSpPr>
+      <p:grpSpPr>
+        <a:xfrm>
+          <a:off x="0" y="0"/>
+          <a:ext cx="0" cy="0"/>
+          <a:chOff x="0" y="0"/>
+          <a:chExt cx="0" cy="0"/>
+        </a:xfrm>
+      </p:grpSpPr>
+      <p:sp>
+        <p:nvSpPr>
+          <p:cNvPr id="2" name="Title 1">
+            <a:extLst>
+              <a:ext uri="{FF2B5EF4-FFF2-40B4-BE49-F238E27FC236}">
+                <a16:creationId xmlns:a16="http://schemas.microsoft.com/office/drawing/2014/main" id="{66C3F40C-9E6A-4ED4-99D1-C35AF20B3144}"/>
+              </a:ext>
+            </a:extLst>
+          </p:cNvPr>
+          <p:cNvSpPr>
+            <a:spLocks noGrp="1"/>
+          </p:cNvSpPr>
+          <p:nvPr>
+            <p:ph type="title"/>
+          </p:nvPr>
+        </p:nvSpPr>
+        <p:spPr/>
+        <p:txBody>
+          <a:bodyPr/>
+          <a:lstStyle/>
+          <a:p>
+            <a:r>
+              <a:rPr lang="en-GB" dirty="0" err="1"/>
+              <a:t>Github</a:t>
+            </a:r>
+            <a:r>
+              <a:rPr lang="en-GB" dirty="0"/>
+              <a:t> commits </a:t>
+            </a:r>
+          </a:p>
+        </p:txBody>
+      </p:sp>
+      <p:pic>
+        <p:nvPicPr>
+          <p:cNvPr id="5" name="Content Placeholder 4" descr="A screenshot of a social media post&#10;&#10;Description automatically generated">
+            <a:extLst>
+              <a:ext uri="{FF2B5EF4-FFF2-40B4-BE49-F238E27FC236}">
+                <a16:creationId xmlns:a16="http://schemas.microsoft.com/office/drawing/2014/main" id="{29336319-91FC-4DF9-A32E-0E18AAEA7AA0}"/>
+              </a:ext>
+            </a:extLst>
+          </p:cNvPr>
+          <p:cNvPicPr>
+            <a:picLocks noGrp="1" noChangeAspect="1"/>
+          </p:cNvPicPr>
+          <p:nvPr>
+            <p:ph idx="1"/>
+          </p:nvPr>
+        </p:nvPicPr>
+        <p:blipFill>
+          <a:blip r:embed="rId2">
+            <a:extLst>
+              <a:ext uri="{28A0092B-C50C-407E-A947-70E740481C1C}">
+                <a14:useLocalDpi xmlns:a14="http://schemas.microsoft.com/office/drawing/2010/main" val="0"/>
+              </a:ext>
+            </a:extLst>
+          </a:blip>
+          <a:stretch>
+            <a:fillRect/>
+          </a:stretch>
+        </p:blipFill>
+        <p:spPr>
+          <a:xfrm>
+            <a:off x="0" y="1356852"/>
+            <a:ext cx="12542028" cy="5880654"/>
+          </a:xfrm>
+        </p:spPr>
+      </p:pic>
+    </p:spTree>
+    <p:extLst>
+      <p:ext uri="{BB962C8B-B14F-4D97-AF65-F5344CB8AC3E}">
+        <p14:creationId xmlns:p14="http://schemas.microsoft.com/office/powerpoint/2010/main" val="2217348981"/>
       </p:ext>
     </p:extLst>
   </p:cSld>
@@ -9150,7 +9787,7 @@
           <a:p>
             <a:r>
               <a:rPr lang="en-GB" dirty="0"/>
-              <a:t>Allow user to login to application</a:t>
+              <a:t>Allow user to login to application(Authentication but not full login)</a:t>
             </a:r>
           </a:p>
           <a:p>
@@ -9168,37 +9805,37 @@
           <a:p>
             <a:r>
               <a:rPr lang="en-GB" dirty="0"/>
-              <a:t>Allow user to create accounts</a:t>
-            </a:r>
-          </a:p>
-          <a:p>
-            <a:r>
-              <a:rPr lang="en-GB" dirty="0"/>
-              <a:t>Allow user to submit bugs with site</a:t>
-            </a:r>
-          </a:p>
-          <a:p>
-            <a:r>
-              <a:rPr lang="en-GB" dirty="0"/>
-              <a:t>Allow user to navigate site easily</a:t>
-            </a:r>
-          </a:p>
-          <a:p>
-            <a:r>
-              <a:rPr lang="en-GB" dirty="0"/>
-              <a:t>Make UI intuitive</a:t>
-            </a:r>
-          </a:p>
-          <a:p>
-            <a:r>
-              <a:rPr lang="en-GB" dirty="0"/>
-              <a:t>Allow user to navigate by category</a:t>
-            </a:r>
-          </a:p>
-          <a:p>
-            <a:r>
-              <a:rPr lang="en-GB" dirty="0"/>
-              <a:t>Gain a substantial knowledge of Full Stack development</a:t>
+              <a:t>Allow user to create accounts(Completed)</a:t>
+            </a:r>
+          </a:p>
+          <a:p>
+            <a:r>
+              <a:rPr lang="en-GB" dirty="0"/>
+              <a:t>Allow user to submit bugs with site(Completed)</a:t>
+            </a:r>
+          </a:p>
+          <a:p>
+            <a:r>
+              <a:rPr lang="en-GB" dirty="0"/>
+              <a:t>Allow user to navigate site easily(Completed)</a:t>
+            </a:r>
+          </a:p>
+          <a:p>
+            <a:r>
+              <a:rPr lang="en-GB" dirty="0"/>
+              <a:t>Make UI intuitive(Completed to best of abilities)</a:t>
+            </a:r>
+          </a:p>
+          <a:p>
+            <a:r>
+              <a:rPr lang="en-GB" dirty="0"/>
+              <a:t>Allow user to navigate by category(Completed)</a:t>
+            </a:r>
+          </a:p>
+          <a:p>
+            <a:r>
+              <a:rPr lang="en-GB" dirty="0"/>
+              <a:t>Gain a substantial knowledge of Full Stack development(Completed)</a:t>
             </a:r>
           </a:p>
         </p:txBody>
@@ -9282,7 +9919,52 @@
           <a:bodyPr/>
           <a:lstStyle/>
           <a:p>
-            <a:endParaRPr lang="en-GB"/>
+            <a:r>
+              <a:rPr lang="en-GB" dirty="0"/>
+              <a:t>The project is broken up into 13 components these are: </a:t>
+            </a:r>
+          </a:p>
+          <a:p>
+            <a:r>
+              <a:rPr lang="en-GB" dirty="0"/>
+              <a:t>About page: lists info about company</a:t>
+            </a:r>
+          </a:p>
+          <a:p>
+            <a:r>
+              <a:rPr lang="en-GB" dirty="0"/>
+              <a:t>Account page: to change password for account</a:t>
+            </a:r>
+          </a:p>
+          <a:p>
+            <a:r>
+              <a:rPr lang="en-GB" dirty="0"/>
+              <a:t>Books page: category page for book items</a:t>
+            </a:r>
+          </a:p>
+          <a:p>
+            <a:r>
+              <a:rPr lang="en-GB" dirty="0"/>
+              <a:t>Cart: this contains items user purchased</a:t>
+            </a:r>
+          </a:p>
+          <a:p>
+            <a:r>
+              <a:rPr lang="en-GB" dirty="0"/>
+              <a:t>Deals: contains pictures and links to items on sale</a:t>
+            </a:r>
+          </a:p>
+          <a:p>
+            <a:r>
+              <a:rPr lang="en-GB" dirty="0"/>
+              <a:t>Electronics: category page</a:t>
+            </a:r>
+          </a:p>
+          <a:p>
+            <a:r>
+              <a:rPr lang="en-GB" dirty="0"/>
+              <a:t>Forgot page: allows user to receive their account password on email if they have valid account</a:t>
+            </a:r>
           </a:p>
         </p:txBody>
       </p:sp>

</xml_diff>